<commit_message>
results v3, recomendations v2
</commit_message>
<xml_diff>
--- a/document/Graphics/gráficas.pptx
+++ b/document/Graphics/gráficas.pptx
@@ -247,7 +247,7 @@
           <a:p>
             <a:fld id="{F99C7A29-F184-4583-9600-8CD6DFE24909}" type="datetimeFigureOut">
               <a:rPr lang="es-ES" smtClean="0"/>
-              <a:t>23/05/2025</a:t>
+              <a:t>24/05/2025</a:t>
             </a:fld>
             <a:endParaRPr lang="es-ES"/>
           </a:p>
@@ -417,7 +417,7 @@
           <a:p>
             <a:fld id="{F99C7A29-F184-4583-9600-8CD6DFE24909}" type="datetimeFigureOut">
               <a:rPr lang="es-ES" smtClean="0"/>
-              <a:t>23/05/2025</a:t>
+              <a:t>24/05/2025</a:t>
             </a:fld>
             <a:endParaRPr lang="es-ES"/>
           </a:p>
@@ -597,7 +597,7 @@
           <a:p>
             <a:fld id="{F99C7A29-F184-4583-9600-8CD6DFE24909}" type="datetimeFigureOut">
               <a:rPr lang="es-ES" smtClean="0"/>
-              <a:t>23/05/2025</a:t>
+              <a:t>24/05/2025</a:t>
             </a:fld>
             <a:endParaRPr lang="es-ES"/>
           </a:p>
@@ -767,7 +767,7 @@
           <a:p>
             <a:fld id="{F99C7A29-F184-4583-9600-8CD6DFE24909}" type="datetimeFigureOut">
               <a:rPr lang="es-ES" smtClean="0"/>
-              <a:t>23/05/2025</a:t>
+              <a:t>24/05/2025</a:t>
             </a:fld>
             <a:endParaRPr lang="es-ES"/>
           </a:p>
@@ -1013,7 +1013,7 @@
           <a:p>
             <a:fld id="{F99C7A29-F184-4583-9600-8CD6DFE24909}" type="datetimeFigureOut">
               <a:rPr lang="es-ES" smtClean="0"/>
-              <a:t>23/05/2025</a:t>
+              <a:t>24/05/2025</a:t>
             </a:fld>
             <a:endParaRPr lang="es-ES"/>
           </a:p>
@@ -1245,7 +1245,7 @@
           <a:p>
             <a:fld id="{F99C7A29-F184-4583-9600-8CD6DFE24909}" type="datetimeFigureOut">
               <a:rPr lang="es-ES" smtClean="0"/>
-              <a:t>23/05/2025</a:t>
+              <a:t>24/05/2025</a:t>
             </a:fld>
             <a:endParaRPr lang="es-ES"/>
           </a:p>
@@ -1612,7 +1612,7 @@
           <a:p>
             <a:fld id="{F99C7A29-F184-4583-9600-8CD6DFE24909}" type="datetimeFigureOut">
               <a:rPr lang="es-ES" smtClean="0"/>
-              <a:t>23/05/2025</a:t>
+              <a:t>24/05/2025</a:t>
             </a:fld>
             <a:endParaRPr lang="es-ES"/>
           </a:p>
@@ -1730,7 +1730,7 @@
           <a:p>
             <a:fld id="{F99C7A29-F184-4583-9600-8CD6DFE24909}" type="datetimeFigureOut">
               <a:rPr lang="es-ES" smtClean="0"/>
-              <a:t>23/05/2025</a:t>
+              <a:t>24/05/2025</a:t>
             </a:fld>
             <a:endParaRPr lang="es-ES"/>
           </a:p>
@@ -1825,7 +1825,7 @@
           <a:p>
             <a:fld id="{F99C7A29-F184-4583-9600-8CD6DFE24909}" type="datetimeFigureOut">
               <a:rPr lang="es-ES" smtClean="0"/>
-              <a:t>23/05/2025</a:t>
+              <a:t>24/05/2025</a:t>
             </a:fld>
             <a:endParaRPr lang="es-ES"/>
           </a:p>
@@ -2102,7 +2102,7 @@
           <a:p>
             <a:fld id="{F99C7A29-F184-4583-9600-8CD6DFE24909}" type="datetimeFigureOut">
               <a:rPr lang="es-ES" smtClean="0"/>
-              <a:t>23/05/2025</a:t>
+              <a:t>24/05/2025</a:t>
             </a:fld>
             <a:endParaRPr lang="es-ES"/>
           </a:p>
@@ -2355,7 +2355,7 @@
           <a:p>
             <a:fld id="{F99C7A29-F184-4583-9600-8CD6DFE24909}" type="datetimeFigureOut">
               <a:rPr lang="es-ES" smtClean="0"/>
-              <a:t>23/05/2025</a:t>
+              <a:t>24/05/2025</a:t>
             </a:fld>
             <a:endParaRPr lang="es-ES"/>
           </a:p>
@@ -2568,7 +2568,7 @@
           <a:p>
             <a:fld id="{F99C7A29-F184-4583-9600-8CD6DFE24909}" type="datetimeFigureOut">
               <a:rPr lang="es-ES" smtClean="0"/>
-              <a:t>23/05/2025</a:t>
+              <a:t>24/05/2025</a:t>
             </a:fld>
             <a:endParaRPr lang="es-ES"/>
           </a:p>
@@ -3609,34 +3609,13 @@
           <a:chExt cx="0" cy="0"/>
         </a:xfrm>
       </p:grpSpPr>
-      <p:sp>
-        <p:nvSpPr>
-          <p:cNvPr id="2" name="Título 1"/>
-          <p:cNvSpPr>
-            <a:spLocks noGrp="1"/>
-          </p:cNvSpPr>
-          <p:nvPr>
-            <p:ph type="title"/>
-          </p:nvPr>
-        </p:nvSpPr>
-        <p:spPr/>
-        <p:txBody>
-          <a:bodyPr/>
-          <a:lstStyle/>
-          <a:p>
-            <a:endParaRPr lang="es-ES"/>
-          </a:p>
-        </p:txBody>
-      </p:sp>
       <p:pic>
         <p:nvPicPr>
-          <p:cNvPr id="4" name="Marcador de contenido 3"/>
+          <p:cNvPr id="11" name="Imagen 10"/>
           <p:cNvPicPr>
-            <a:picLocks noGrp="1" noChangeAspect="1"/>
+            <a:picLocks noChangeAspect="1"/>
           </p:cNvPicPr>
-          <p:nvPr>
-            <p:ph idx="1"/>
-          </p:nvPr>
+          <p:nvPr/>
         </p:nvPicPr>
         <p:blipFill>
           <a:blip r:embed="rId2">
@@ -3652,18 +3631,23 @@
         </p:blipFill>
         <p:spPr>
           <a:xfrm>
-            <a:off x="5362245" y="1690688"/>
-            <a:ext cx="5001778" cy="4142240"/>
-          </a:xfrm>
+            <a:off x="219990" y="1690688"/>
+            <a:ext cx="5138938" cy="4224536"/>
+          </a:xfrm>
+          <a:prstGeom prst="rect">
+            <a:avLst/>
+          </a:prstGeom>
         </p:spPr>
       </p:pic>
       <p:pic>
         <p:nvPicPr>
-          <p:cNvPr id="5" name="Imagen 4"/>
+          <p:cNvPr id="9" name="Marcador de contenido 8"/>
           <p:cNvPicPr>
-            <a:picLocks noChangeAspect="1"/>
+            <a:picLocks noGrp="1" noChangeAspect="1"/>
           </p:cNvPicPr>
-          <p:nvPr/>
+          <p:nvPr>
+            <p:ph idx="1"/>
+          </p:nvPr>
         </p:nvPicPr>
         <p:blipFill>
           <a:blip r:embed="rId3">
@@ -3679,14 +3663,30 @@
         </p:blipFill>
         <p:spPr>
           <a:xfrm>
-            <a:off x="360467" y="1690688"/>
-            <a:ext cx="5001778" cy="4142240"/>
-          </a:xfrm>
-          <a:prstGeom prst="rect">
-            <a:avLst/>
-          </a:prstGeom>
+            <a:off x="5358928" y="1690688"/>
+            <a:ext cx="5138938" cy="4224536"/>
+          </a:xfrm>
         </p:spPr>
       </p:pic>
+      <p:sp>
+        <p:nvSpPr>
+          <p:cNvPr id="2" name="Título 1"/>
+          <p:cNvSpPr>
+            <a:spLocks noGrp="1"/>
+          </p:cNvSpPr>
+          <p:nvPr>
+            <p:ph type="title"/>
+          </p:nvPr>
+        </p:nvSpPr>
+        <p:spPr/>
+        <p:txBody>
+          <a:bodyPr/>
+          <a:lstStyle/>
+          <a:p>
+            <a:endParaRPr lang="es-ES"/>
+          </a:p>
+        </p:txBody>
+      </p:sp>
       <p:pic>
         <p:nvPicPr>
           <p:cNvPr id="6" name="Imagen 5"/>
@@ -3696,7 +3696,7 @@
           <p:nvPr/>
         </p:nvPicPr>
         <p:blipFill rotWithShape="1">
-          <a:blip r:embed="rId3">
+          <a:blip r:embed="rId4">
             <a:extLst>
               <a:ext uri="{28A0092B-C50C-407E-A947-70E740481C1C}">
                 <a14:useLocalDpi xmlns:a14="http://schemas.microsoft.com/office/drawing/2010/main" val="0"/>
@@ -3725,7 +3725,7 @@
           <p:nvPr/>
         </p:nvPicPr>
         <p:blipFill rotWithShape="1">
-          <a:blip r:embed="rId3">
+          <a:blip r:embed="rId4">
             <a:extLst>
               <a:ext uri="{28A0092B-C50C-407E-A947-70E740481C1C}">
                 <a14:useLocalDpi xmlns:a14="http://schemas.microsoft.com/office/drawing/2010/main" val="0"/>
@@ -3753,7 +3753,7 @@
         </p:nvSpPr>
         <p:spPr>
           <a:xfrm>
-            <a:off x="1411108" y="2634111"/>
+            <a:off x="1396779" y="2671292"/>
             <a:ext cx="1235466" cy="307777"/>
           </a:xfrm>
           <a:prstGeom prst="rect">
@@ -3791,7 +3791,7 @@
         </p:nvSpPr>
         <p:spPr>
           <a:xfrm>
-            <a:off x="6412885" y="2634111"/>
+            <a:off x="6535717" y="2634111"/>
             <a:ext cx="1235466" cy="307777"/>
           </a:xfrm>
           <a:prstGeom prst="rect">

</xml_diff>